<commit_message>
Version 1.0 Slot machine Prod ready.
</commit_message>
<xml_diff>
--- a/image_sources/advanced_slot_machine_instructions.pptx
+++ b/image_sources/advanced_slot_machine_instructions.pptx
@@ -288,7 +288,7 @@
           <a:p>
             <a:fld id="{6BFECD78-3C8E-49F2-8FAB-59489D168ABB}" type="datetimeFigureOut">
               <a:rPr lang="en-US" smtClean="0"/>
-              <a:t>01/08/15</a:t>
+              <a:t>03/08/15</a:t>
             </a:fld>
             <a:endParaRPr lang="en-US"/>
           </a:p>
@@ -458,7 +458,7 @@
           <a:p>
             <a:fld id="{6BFECD78-3C8E-49F2-8FAB-59489D168ABB}" type="datetimeFigureOut">
               <a:rPr lang="en-US" smtClean="0"/>
-              <a:t>01/08/15</a:t>
+              <a:t>03/08/15</a:t>
             </a:fld>
             <a:endParaRPr lang="en-US"/>
           </a:p>
@@ -638,7 +638,7 @@
           <a:p>
             <a:fld id="{6BFECD78-3C8E-49F2-8FAB-59489D168ABB}" type="datetimeFigureOut">
               <a:rPr lang="en-US" smtClean="0"/>
-              <a:t>01/08/15</a:t>
+              <a:t>03/08/15</a:t>
             </a:fld>
             <a:endParaRPr lang="en-US"/>
           </a:p>
@@ -808,7 +808,7 @@
           <a:p>
             <a:fld id="{6BFECD78-3C8E-49F2-8FAB-59489D168ABB}" type="datetimeFigureOut">
               <a:rPr lang="en-US" smtClean="0"/>
-              <a:t>01/08/15</a:t>
+              <a:t>03/08/15</a:t>
             </a:fld>
             <a:endParaRPr lang="en-US"/>
           </a:p>
@@ -1054,7 +1054,7 @@
           <a:p>
             <a:fld id="{6BFECD78-3C8E-49F2-8FAB-59489D168ABB}" type="datetimeFigureOut">
               <a:rPr lang="en-US" smtClean="0"/>
-              <a:t>01/08/15</a:t>
+              <a:t>03/08/15</a:t>
             </a:fld>
             <a:endParaRPr lang="en-US"/>
           </a:p>
@@ -1342,7 +1342,7 @@
           <a:p>
             <a:fld id="{6BFECD78-3C8E-49F2-8FAB-59489D168ABB}" type="datetimeFigureOut">
               <a:rPr lang="en-US" smtClean="0"/>
-              <a:t>01/08/15</a:t>
+              <a:t>03/08/15</a:t>
             </a:fld>
             <a:endParaRPr lang="en-US"/>
           </a:p>
@@ -1764,7 +1764,7 @@
           <a:p>
             <a:fld id="{6BFECD78-3C8E-49F2-8FAB-59489D168ABB}" type="datetimeFigureOut">
               <a:rPr lang="en-US" smtClean="0"/>
-              <a:t>01/08/15</a:t>
+              <a:t>03/08/15</a:t>
             </a:fld>
             <a:endParaRPr lang="en-US"/>
           </a:p>
@@ -1882,7 +1882,7 @@
           <a:p>
             <a:fld id="{6BFECD78-3C8E-49F2-8FAB-59489D168ABB}" type="datetimeFigureOut">
               <a:rPr lang="en-US" smtClean="0"/>
-              <a:t>01/08/15</a:t>
+              <a:t>03/08/15</a:t>
             </a:fld>
             <a:endParaRPr lang="en-US"/>
           </a:p>
@@ -1977,7 +1977,7 @@
           <a:p>
             <a:fld id="{6BFECD78-3C8E-49F2-8FAB-59489D168ABB}" type="datetimeFigureOut">
               <a:rPr lang="en-US" smtClean="0"/>
-              <a:t>01/08/15</a:t>
+              <a:t>03/08/15</a:t>
             </a:fld>
             <a:endParaRPr lang="en-US"/>
           </a:p>
@@ -2254,7 +2254,7 @@
           <a:p>
             <a:fld id="{6BFECD78-3C8E-49F2-8FAB-59489D168ABB}" type="datetimeFigureOut">
               <a:rPr lang="en-US" smtClean="0"/>
-              <a:t>01/08/15</a:t>
+              <a:t>03/08/15</a:t>
             </a:fld>
             <a:endParaRPr lang="en-US"/>
           </a:p>
@@ -2511,7 +2511,7 @@
           <a:p>
             <a:fld id="{6BFECD78-3C8E-49F2-8FAB-59489D168ABB}" type="datetimeFigureOut">
               <a:rPr lang="en-US" smtClean="0"/>
-              <a:t>01/08/15</a:t>
+              <a:t>03/08/15</a:t>
             </a:fld>
             <a:endParaRPr lang="en-US"/>
           </a:p>
@@ -2724,7 +2724,7 @@
           <a:p>
             <a:fld id="{6BFECD78-3C8E-49F2-8FAB-59489D168ABB}" type="datetimeFigureOut">
               <a:rPr lang="en-US" smtClean="0"/>
-              <a:t>01/08/15</a:t>
+              <a:t>03/08/15</a:t>
             </a:fld>
             <a:endParaRPr lang="en-US"/>
           </a:p>
@@ -3650,7 +3650,17 @@
                 <a:latin typeface="Oswald Bold"/>
                 <a:cs typeface="Oswald Bold"/>
               </a:rPr>
-              <a:t>Change machines if and when you choose throughout the game </a:t>
+              <a:t>Change machines if and when you choose throughout the </a:t>
+            </a:r>
+            <a:r>
+              <a:rPr lang="en-US" sz="1600" dirty="0" smtClean="0">
+                <a:solidFill>
+                  <a:srgbClr val="FF00FF"/>
+                </a:solidFill>
+                <a:latin typeface="Oswald Bold"/>
+                <a:cs typeface="Oswald Bold"/>
+              </a:rPr>
+              <a:t>game. </a:t>
             </a:r>
             <a:endParaRPr lang="en-US" sz="1600" dirty="0">
               <a:solidFill>
@@ -3692,7 +3702,17 @@
                 <a:latin typeface="Oswald Bold"/>
                 <a:cs typeface="Oswald Bold"/>
               </a:rPr>
-              <a:t>The scoreboard tells you how much each sequence is worth</a:t>
+              <a:t>The scoreboard tells you how much each sequence is </a:t>
+            </a:r>
+            <a:r>
+              <a:rPr lang="en-US" sz="1600" dirty="0" smtClean="0">
+                <a:solidFill>
+                  <a:srgbClr val="00CCFF"/>
+                </a:solidFill>
+                <a:latin typeface="Oswald Bold"/>
+                <a:cs typeface="Oswald Bold"/>
+              </a:rPr>
+              <a:t>worth.</a:t>
             </a:r>
             <a:endParaRPr lang="en-US" sz="1600" dirty="0">
               <a:solidFill>

</xml_diff>